<commit_message>
update readme for all
</commit_message>
<xml_diff>
--- a/06AlgoData/02MoE/11MOECode.pptx
+++ b/06AlgoData/02MoE/11MOECode.pptx
@@ -9,10 +9,10 @@
     <p:sldMasterId id="2147483683" r:id="rId5"/>
   </p:sldMasterIdLst>
   <p:notesMasterIdLst>
-    <p:notesMasterId r:id="rId17"/>
+    <p:notesMasterId r:id="rId18"/>
   </p:notesMasterIdLst>
   <p:handoutMasterIdLst>
-    <p:handoutMasterId r:id="rId18"/>
+    <p:handoutMasterId r:id="rId19"/>
   </p:handoutMasterIdLst>
   <p:sldIdLst>
     <p:sldId id="603" r:id="rId6"/>
@@ -24,8 +24,9 @@
     <p:sldId id="2511" r:id="rId12"/>
     <p:sldId id="2469" r:id="rId13"/>
     <p:sldId id="2512" r:id="rId14"/>
-    <p:sldId id="582" r:id="rId15"/>
-    <p:sldId id="2419" r:id="rId16"/>
+    <p:sldId id="2513" r:id="rId15"/>
+    <p:sldId id="582" r:id="rId16"/>
+    <p:sldId id="2419" r:id="rId17"/>
   </p:sldIdLst>
   <p:sldSz cx="12196763" cy="6858000"/>
   <p:notesSz cx="6858000" cy="9144000"/>
@@ -32330,6 +32331,130 @@
           <a:chExt cx="0" cy="0"/>
         </a:xfrm>
       </p:grpSpPr>
+      <p:sp>
+        <p:nvSpPr>
+          <p:cNvPr id="3" name="标题 2">
+            <a:extLst>
+              <a:ext uri="{FF2B5EF4-FFF2-40B4-BE49-F238E27FC236}">
+                <a16:creationId xmlns:a16="http://schemas.microsoft.com/office/drawing/2014/main" id="{0653A425-F185-D44A-DE1D-5F8364A4EB9B}"/>
+              </a:ext>
+            </a:extLst>
+          </p:cNvPr>
+          <p:cNvSpPr>
+            <a:spLocks noGrp="1"/>
+          </p:cNvSpPr>
+          <p:nvPr>
+            <p:ph type="title"/>
+          </p:nvPr>
+        </p:nvSpPr>
+        <p:spPr/>
+        <p:txBody>
+          <a:bodyPr/>
+          <a:lstStyle/>
+          <a:p>
+            <a:r>
+              <a:rPr lang="en" altLang="zh-CN" dirty="0"/>
+              <a:t>Ascend</a:t>
+            </a:r>
+            <a:r>
+              <a:rPr lang="zh-CN" altLang="en-US" dirty="0"/>
+              <a:t> </a:t>
+            </a:r>
+            <a:r>
+              <a:rPr lang="en" altLang="zh-CN" dirty="0" err="1"/>
+              <a:t>MindStudio</a:t>
+            </a:r>
+            <a:endParaRPr lang="zh-CN" altLang="en-US" dirty="0"/>
+          </a:p>
+        </p:txBody>
+      </p:sp>
+      <p:pic>
+        <p:nvPicPr>
+          <p:cNvPr id="2050" name="Picture 2" descr="MindStudio概述">
+            <a:extLst>
+              <a:ext uri="{FF2B5EF4-FFF2-40B4-BE49-F238E27FC236}">
+                <a16:creationId xmlns:a16="http://schemas.microsoft.com/office/drawing/2014/main" id="{0C3657B9-E5B9-C71E-C388-4831E29EA00D}"/>
+              </a:ext>
+            </a:extLst>
+          </p:cNvPr>
+          <p:cNvPicPr>
+            <a:picLocks noChangeAspect="1" noChangeArrowheads="1"/>
+          </p:cNvPicPr>
+          <p:nvPr/>
+        </p:nvPicPr>
+        <p:blipFill rotWithShape="1">
+          <a:blip r:embed="rId2">
+            <a:extLst>
+              <a:ext uri="{28A0092B-C50C-407E-A947-70E740481C1C}">
+                <a14:useLocalDpi xmlns:a14="http://schemas.microsoft.com/office/drawing/2010/main" val="0"/>
+              </a:ext>
+            </a:extLst>
+          </a:blip>
+          <a:srcRect b="16252"/>
+          <a:stretch/>
+        </p:blipFill>
+        <p:spPr bwMode="auto">
+          <a:xfrm>
+            <a:off x="1087084" y="1134257"/>
+            <a:ext cx="10022594" cy="5200954"/>
+          </a:xfrm>
+          <a:prstGeom prst="rect">
+            <a:avLst/>
+          </a:prstGeom>
+          <a:noFill/>
+          <a:extLst>
+            <a:ext uri="{909E8E84-426E-40DD-AFC4-6F175D3DCCD1}">
+              <a14:hiddenFill xmlns:a14="http://schemas.microsoft.com/office/drawing/2010/main">
+                <a:solidFill>
+                  <a:srgbClr val="FFFFFF"/>
+                </a:solidFill>
+              </a14:hiddenFill>
+            </a:ext>
+          </a:extLst>
+        </p:spPr>
+      </p:pic>
+    </p:spTree>
+    <p:extLst>
+      <p:ext uri="{BB962C8B-B14F-4D97-AF65-F5344CB8AC3E}">
+        <p14:creationId xmlns:p14="http://schemas.microsoft.com/office/powerpoint/2010/main" val="2711891030"/>
+      </p:ext>
+    </p:extLst>
+  </p:cSld>
+  <p:clrMapOvr>
+    <a:masterClrMapping/>
+  </p:clrMapOvr>
+  <mc:AlternateContent xmlns:mc="http://schemas.openxmlformats.org/markup-compatibility/2006" xmlns:p159="http://schemas.microsoft.com/office/powerpoint/2015/09/main">
+    <mc:Choice Requires="p159">
+      <p:transition xmlns:p14="http://schemas.microsoft.com/office/powerpoint/2010/main" spd="slow" p14:dur="2000">
+        <p159:morph option="byObject"/>
+      </p:transition>
+    </mc:Choice>
+    <mc:Fallback xmlns="">
+      <p:transition spd="slow">
+        <p:fade/>
+      </p:transition>
+    </mc:Fallback>
+  </mc:AlternateContent>
+</p:sld>
+</file>
+
+<file path=ppt/slides/slide11.xml><?xml version="1.0" encoding="utf-8"?>
+<p:sld xmlns:a="http://schemas.openxmlformats.org/drawingml/2006/main" xmlns:r="http://schemas.openxmlformats.org/officeDocument/2006/relationships" xmlns:p="http://schemas.openxmlformats.org/presentationml/2006/main">
+  <p:cSld>
+    <p:spTree>
+      <p:nvGrpSpPr>
+        <p:cNvPr id="1" name=""/>
+        <p:cNvGrpSpPr/>
+        <p:nvPr/>
+      </p:nvGrpSpPr>
+      <p:grpSpPr>
+        <a:xfrm>
+          <a:off x="0" y="0"/>
+          <a:ext cx="0" cy="0"/>
+          <a:chOff x="0" y="0"/>
+          <a:chExt cx="0" cy="0"/>
+        </a:xfrm>
+      </p:grpSpPr>
     </p:spTree>
     <p:extLst>
       <p:ext uri="{BB962C8B-B14F-4D97-AF65-F5344CB8AC3E}">
@@ -32355,7 +32480,7 @@
 </p:sld>
 </file>
 
-<file path=ppt/slides/slide11.xml><?xml version="1.0" encoding="utf-8"?>
+<file path=ppt/slides/slide12.xml><?xml version="1.0" encoding="utf-8"?>
 <p:sld xmlns:a="http://schemas.openxmlformats.org/drawingml/2006/main" xmlns:r="http://schemas.openxmlformats.org/officeDocument/2006/relationships" xmlns:p="http://schemas.openxmlformats.org/presentationml/2006/main">
   <p:cSld>
     <p:spTree>
@@ -33833,35 +33958,69 @@
           <a:bodyPr/>
           <a:lstStyle/>
           <a:p>
-            <a:endParaRPr lang="zh-CN" altLang="en-US"/>
+            <a:r>
+              <a:rPr lang="en" altLang="zh-CN" dirty="0"/>
+              <a:t>NVIDIA </a:t>
+            </a:r>
+            <a:r>
+              <a:rPr lang="en" altLang="zh-CN" dirty="0" err="1"/>
+              <a:t>Nsight</a:t>
+            </a:r>
+            <a:r>
+              <a:rPr lang="en" altLang="zh-CN" dirty="0"/>
+              <a:t> Systems</a:t>
+            </a:r>
+            <a:endParaRPr lang="zh-CN" altLang="en-US" dirty="0"/>
           </a:p>
         </p:txBody>
       </p:sp>
-      <p:sp>
-        <p:nvSpPr>
-          <p:cNvPr id="4" name="内容占位符 3">
+      <p:pic>
+        <p:nvPicPr>
+          <p:cNvPr id="1026" name="Picture 2" descr="Nsight Systems | NVIDIA Developer">
             <a:extLst>
               <a:ext uri="{FF2B5EF4-FFF2-40B4-BE49-F238E27FC236}">
-                <a16:creationId xmlns:a16="http://schemas.microsoft.com/office/drawing/2014/main" id="{D6AF4854-312A-87C3-E779-A69081045A03}"/>
+                <a16:creationId xmlns:a16="http://schemas.microsoft.com/office/drawing/2014/main" id="{9E74B8DF-7D9D-2182-764D-FBA75820FD68}"/>
               </a:ext>
             </a:extLst>
           </p:cNvPr>
-          <p:cNvSpPr>
-            <a:spLocks noGrp="1"/>
-          </p:cNvSpPr>
-          <p:nvPr>
-            <p:ph sz="half" idx="1"/>
-          </p:nvPr>
-        </p:nvSpPr>
-        <p:spPr/>
-        <p:txBody>
-          <a:bodyPr/>
-          <a:lstStyle/>
-          <a:p>
-            <a:endParaRPr lang="zh-CN" altLang="en-US"/>
-          </a:p>
-        </p:txBody>
-      </p:sp>
+          <p:cNvPicPr>
+            <a:picLocks noChangeAspect="1" noChangeArrowheads="1"/>
+          </p:cNvPicPr>
+          <p:nvPr/>
+        </p:nvPicPr>
+        <p:blipFill>
+          <a:blip r:embed="rId2">
+            <a:extLst>
+              <a:ext uri="{28A0092B-C50C-407E-A947-70E740481C1C}">
+                <a14:useLocalDpi xmlns:a14="http://schemas.microsoft.com/office/drawing/2010/main" val="0"/>
+              </a:ext>
+            </a:extLst>
+          </a:blip>
+          <a:srcRect/>
+          <a:stretch>
+            <a:fillRect/>
+          </a:stretch>
+        </p:blipFill>
+        <p:spPr bwMode="auto">
+          <a:xfrm>
+            <a:off x="1188089" y="1246909"/>
+            <a:ext cx="9834563" cy="5163689"/>
+          </a:xfrm>
+          <a:prstGeom prst="rect">
+            <a:avLst/>
+          </a:prstGeom>
+          <a:noFill/>
+          <a:extLst>
+            <a:ext uri="{909E8E84-426E-40DD-AFC4-6F175D3DCCD1}">
+              <a14:hiddenFill xmlns:a14="http://schemas.microsoft.com/office/drawing/2010/main">
+                <a:solidFill>
+                  <a:srgbClr val="FFFFFF"/>
+                </a:solidFill>
+              </a14:hiddenFill>
+            </a:ext>
+          </a:extLst>
+        </p:spPr>
+      </p:pic>
     </p:spTree>
     <p:extLst>
       <p:ext uri="{BB962C8B-B14F-4D97-AF65-F5344CB8AC3E}">

</xml_diff>